<commit_message>
2.1 Ticket tracker classes and tests were added
</commit_message>
<xml_diff>
--- a/chapter_002/src/main/java/ru/vmerkotan/tracker/Tracker.pptx
+++ b/chapter_002/src/main/java/ru/vmerkotan/tracker/Tracker.pptx
@@ -289,7 +289,7 @@
           <a:p>
             <a:fld id="{D784C0B5-65C7-4EAD-AFF1-1BC19C5114D1}" type="datetimeFigureOut">
               <a:rPr lang="en-US" smtClean="0"/>
-              <a:t>12/5/2016</a:t>
+              <a:t>12/7/2016</a:t>
             </a:fld>
             <a:endParaRPr lang="en-US"/>
           </a:p>
@@ -459,7 +459,7 @@
           <a:p>
             <a:fld id="{D784C0B5-65C7-4EAD-AFF1-1BC19C5114D1}" type="datetimeFigureOut">
               <a:rPr lang="en-US" smtClean="0"/>
-              <a:t>12/5/2016</a:t>
+              <a:t>12/7/2016</a:t>
             </a:fld>
             <a:endParaRPr lang="en-US"/>
           </a:p>
@@ -639,7 +639,7 @@
           <a:p>
             <a:fld id="{D784C0B5-65C7-4EAD-AFF1-1BC19C5114D1}" type="datetimeFigureOut">
               <a:rPr lang="en-US" smtClean="0"/>
-              <a:t>12/5/2016</a:t>
+              <a:t>12/7/2016</a:t>
             </a:fld>
             <a:endParaRPr lang="en-US"/>
           </a:p>
@@ -809,7 +809,7 @@
           <a:p>
             <a:fld id="{D784C0B5-65C7-4EAD-AFF1-1BC19C5114D1}" type="datetimeFigureOut">
               <a:rPr lang="en-US" smtClean="0"/>
-              <a:t>12/5/2016</a:t>
+              <a:t>12/7/2016</a:t>
             </a:fld>
             <a:endParaRPr lang="en-US"/>
           </a:p>
@@ -1055,7 +1055,7 @@
           <a:p>
             <a:fld id="{D784C0B5-65C7-4EAD-AFF1-1BC19C5114D1}" type="datetimeFigureOut">
               <a:rPr lang="en-US" smtClean="0"/>
-              <a:t>12/5/2016</a:t>
+              <a:t>12/7/2016</a:t>
             </a:fld>
             <a:endParaRPr lang="en-US"/>
           </a:p>
@@ -1343,7 +1343,7 @@
           <a:p>
             <a:fld id="{D784C0B5-65C7-4EAD-AFF1-1BC19C5114D1}" type="datetimeFigureOut">
               <a:rPr lang="en-US" smtClean="0"/>
-              <a:t>12/5/2016</a:t>
+              <a:t>12/7/2016</a:t>
             </a:fld>
             <a:endParaRPr lang="en-US"/>
           </a:p>
@@ -1765,7 +1765,7 @@
           <a:p>
             <a:fld id="{D784C0B5-65C7-4EAD-AFF1-1BC19C5114D1}" type="datetimeFigureOut">
               <a:rPr lang="en-US" smtClean="0"/>
-              <a:t>12/5/2016</a:t>
+              <a:t>12/7/2016</a:t>
             </a:fld>
             <a:endParaRPr lang="en-US"/>
           </a:p>
@@ -1883,7 +1883,7 @@
           <a:p>
             <a:fld id="{D784C0B5-65C7-4EAD-AFF1-1BC19C5114D1}" type="datetimeFigureOut">
               <a:rPr lang="en-US" smtClean="0"/>
-              <a:t>12/5/2016</a:t>
+              <a:t>12/7/2016</a:t>
             </a:fld>
             <a:endParaRPr lang="en-US"/>
           </a:p>
@@ -1978,7 +1978,7 @@
           <a:p>
             <a:fld id="{D784C0B5-65C7-4EAD-AFF1-1BC19C5114D1}" type="datetimeFigureOut">
               <a:rPr lang="en-US" smtClean="0"/>
-              <a:t>12/5/2016</a:t>
+              <a:t>12/7/2016</a:t>
             </a:fld>
             <a:endParaRPr lang="en-US"/>
           </a:p>
@@ -2255,7 +2255,7 @@
           <a:p>
             <a:fld id="{D784C0B5-65C7-4EAD-AFF1-1BC19C5114D1}" type="datetimeFigureOut">
               <a:rPr lang="en-US" smtClean="0"/>
-              <a:t>12/5/2016</a:t>
+              <a:t>12/7/2016</a:t>
             </a:fld>
             <a:endParaRPr lang="en-US"/>
           </a:p>
@@ -2508,7 +2508,7 @@
           <a:p>
             <a:fld id="{D784C0B5-65C7-4EAD-AFF1-1BC19C5114D1}" type="datetimeFigureOut">
               <a:rPr lang="en-US" smtClean="0"/>
-              <a:t>12/5/2016</a:t>
+              <a:t>12/7/2016</a:t>
             </a:fld>
             <a:endParaRPr lang="en-US"/>
           </a:p>
@@ -2721,7 +2721,7 @@
           <a:p>
             <a:fld id="{D784C0B5-65C7-4EAD-AFF1-1BC19C5114D1}" type="datetimeFigureOut">
               <a:rPr lang="en-US" smtClean="0"/>
-              <a:t>12/5/2016</a:t>
+              <a:t>12/7/2016</a:t>
             </a:fld>
             <a:endParaRPr lang="en-US"/>
           </a:p>
@@ -3105,7 +3105,7 @@
         <p:spPr>
           <a:xfrm>
             <a:off x="1295400" y="1951687"/>
-            <a:ext cx="1905000" cy="2308324"/>
+            <a:ext cx="1905000" cy="3493264"/>
           </a:xfrm>
           <a:prstGeom prst="rect">
             <a:avLst/>
@@ -3162,8 +3162,13 @@
           <a:p>
             <a:r>
               <a:rPr lang="en-US" sz="1100" dirty="0" smtClean="0"/>
-              <a:t>id : Integer</a:t>
-            </a:r>
+              <a:t>id : </a:t>
+            </a:r>
+            <a:r>
+              <a:rPr lang="en-US" sz="1100" dirty="0" smtClean="0"/>
+              <a:t>long</a:t>
+            </a:r>
+            <a:endParaRPr lang="en-US" sz="1100" dirty="0" smtClean="0"/>
           </a:p>
           <a:p>
             <a:r>
@@ -3182,6 +3187,18 @@
             </a:r>
           </a:p>
           <a:p>
+            <a:r>
+              <a:rPr lang="en-US" sz="1100" dirty="0" err="1" smtClean="0"/>
+              <a:t>commentPossition</a:t>
+            </a:r>
+            <a:r>
+              <a:rPr lang="en-US" sz="1100" dirty="0" smtClean="0"/>
+              <a:t> : </a:t>
+            </a:r>
+            <a:r>
+              <a:rPr lang="en-US" sz="1100" dirty="0" err="1" smtClean="0"/>
+              <a:t>int</a:t>
+            </a:r>
             <a:endParaRPr lang="en-US" sz="1100" dirty="0" smtClean="0"/>
           </a:p>
           <a:p>
@@ -3191,6 +3208,76 @@
             <a:r>
               <a:rPr lang="en-US" sz="1100" dirty="0" err="1" smtClean="0"/>
               <a:t>addComment</a:t>
+            </a:r>
+            <a:r>
+              <a:rPr lang="en-US" sz="1100" dirty="0" smtClean="0"/>
+              <a:t>()</a:t>
+            </a:r>
+          </a:p>
+          <a:p>
+            <a:r>
+              <a:rPr lang="en-US" sz="1100" dirty="0" err="1" smtClean="0"/>
+              <a:t>getId</a:t>
+            </a:r>
+            <a:r>
+              <a:rPr lang="en-US" sz="1100" dirty="0" smtClean="0"/>
+              <a:t>()</a:t>
+            </a:r>
+          </a:p>
+          <a:p>
+            <a:r>
+              <a:rPr lang="en-US" sz="1100" dirty="0" err="1" smtClean="0"/>
+              <a:t>getName</a:t>
+            </a:r>
+            <a:r>
+              <a:rPr lang="en-US" sz="1100" dirty="0" smtClean="0"/>
+              <a:t>()</a:t>
+            </a:r>
+          </a:p>
+          <a:p>
+            <a:r>
+              <a:rPr lang="en-US" sz="1100" dirty="0" err="1" smtClean="0"/>
+              <a:t>getDescription</a:t>
+            </a:r>
+            <a:r>
+              <a:rPr lang="en-US" sz="1100" dirty="0" smtClean="0"/>
+              <a:t>()</a:t>
+            </a:r>
+          </a:p>
+          <a:p>
+            <a:r>
+              <a:rPr lang="en-US" sz="1100" dirty="0" err="1" smtClean="0"/>
+              <a:t>getCreatedDate</a:t>
+            </a:r>
+            <a:r>
+              <a:rPr lang="en-US" sz="1100" dirty="0" smtClean="0"/>
+              <a:t>()</a:t>
+            </a:r>
+          </a:p>
+          <a:p>
+            <a:r>
+              <a:rPr lang="en-US" sz="1100" dirty="0" err="1" smtClean="0"/>
+              <a:t>getComments</a:t>
+            </a:r>
+            <a:r>
+              <a:rPr lang="en-US" sz="1100" dirty="0" smtClean="0"/>
+              <a:t>()</a:t>
+            </a:r>
+          </a:p>
+          <a:p>
+            <a:r>
+              <a:rPr lang="en-US" sz="1100" dirty="0" err="1" smtClean="0"/>
+              <a:t>setName</a:t>
+            </a:r>
+            <a:r>
+              <a:rPr lang="en-US" sz="1100" dirty="0" smtClean="0"/>
+              <a:t>()</a:t>
+            </a:r>
+          </a:p>
+          <a:p>
+            <a:r>
+              <a:rPr lang="en-US" sz="1100" dirty="0" err="1" smtClean="0"/>
+              <a:t>setDescription</a:t>
             </a:r>
             <a:r>
               <a:rPr lang="en-US" sz="1100" dirty="0" smtClean="0"/>
@@ -3269,7 +3356,7 @@
         <p:spPr>
           <a:xfrm>
             <a:off x="4495800" y="1951687"/>
-            <a:ext cx="1905000" cy="2139047"/>
+            <a:ext cx="1905000" cy="2816156"/>
           </a:xfrm>
           <a:prstGeom prst="rect">
             <a:avLst/>
@@ -3314,8 +3401,23 @@
           <a:p>
             <a:r>
               <a:rPr lang="en-US" sz="1100" dirty="0" smtClean="0"/>
-              <a:t>tickets : Ticket[]</a:t>
-            </a:r>
+              <a:t>tickets : Ticket</a:t>
+            </a:r>
+            <a:r>
+              <a:rPr lang="en-US" sz="1100" dirty="0" smtClean="0"/>
+              <a:t>[]</a:t>
+            </a:r>
+          </a:p>
+          <a:p>
+            <a:r>
+              <a:rPr lang="en-US" sz="1100" dirty="0" smtClean="0"/>
+              <a:t>position : </a:t>
+            </a:r>
+            <a:r>
+              <a:rPr lang="en-US" sz="1100" dirty="0" err="1" smtClean="0"/>
+              <a:t>int</a:t>
+            </a:r>
+            <a:endParaRPr lang="en-US" sz="1100" dirty="0" smtClean="0"/>
           </a:p>
           <a:p>
             <a:endParaRPr lang="en-US" sz="1100" dirty="0"/>
@@ -3333,7 +3435,7 @@
           <a:p>
             <a:r>
               <a:rPr lang="en-US" sz="1100" dirty="0" err="1" smtClean="0"/>
-              <a:t>removeTicket</a:t>
+              <a:t>getAllTickets</a:t>
             </a:r>
             <a:r>
               <a:rPr lang="en-US" sz="1100" dirty="0" smtClean="0"/>
@@ -3343,7 +3445,7 @@
           <a:p>
             <a:r>
               <a:rPr lang="en-US" sz="1100" dirty="0" err="1" smtClean="0"/>
-              <a:t>editTicket</a:t>
+              <a:t>getTicketById</a:t>
             </a:r>
             <a:r>
               <a:rPr lang="en-US" sz="1100" dirty="0" smtClean="0"/>
@@ -3353,7 +3455,7 @@
           <a:p>
             <a:r>
               <a:rPr lang="en-US" sz="1100" dirty="0" err="1" smtClean="0"/>
-              <a:t>filterTickets</a:t>
+              <a:t>deleteTicketById</a:t>
             </a:r>
             <a:r>
               <a:rPr lang="en-US" sz="1100" dirty="0" smtClean="0"/>
@@ -3361,6 +3463,44 @@
             </a:r>
           </a:p>
           <a:p>
+            <a:r>
+              <a:rPr lang="en-US" sz="1100" dirty="0" err="1" smtClean="0"/>
+              <a:t>addCommentToTicket</a:t>
+            </a:r>
+            <a:r>
+              <a:rPr lang="en-US" sz="1100" dirty="0" smtClean="0"/>
+              <a:t>()</a:t>
+            </a:r>
+          </a:p>
+          <a:p>
+            <a:r>
+              <a:rPr lang="en-US" sz="1100" dirty="0" err="1" smtClean="0"/>
+              <a:t>updateTicket</a:t>
+            </a:r>
+            <a:r>
+              <a:rPr lang="en-US" sz="1100" dirty="0" smtClean="0"/>
+              <a:t>()</a:t>
+            </a:r>
+          </a:p>
+          <a:p>
+            <a:r>
+              <a:rPr lang="en-US" sz="1100" dirty="0" err="1" smtClean="0"/>
+              <a:t>filterTicketsByName</a:t>
+            </a:r>
+            <a:r>
+              <a:rPr lang="en-US" sz="1100" dirty="0" smtClean="0"/>
+              <a:t>()</a:t>
+            </a:r>
+          </a:p>
+          <a:p>
+            <a:r>
+              <a:rPr lang="en-US" sz="1100" dirty="0" err="1" smtClean="0"/>
+              <a:t>FilterTicketsCreatedAfter</a:t>
+            </a:r>
+            <a:r>
+              <a:rPr lang="en-US" sz="1100" dirty="0" smtClean="0"/>
+              <a:t>()</a:t>
+            </a:r>
             <a:endParaRPr lang="en-US" sz="1100" dirty="0"/>
           </a:p>
         </p:txBody>
@@ -3403,7 +3543,7 @@
         </p:nvCxnSpPr>
         <p:spPr>
           <a:xfrm>
-            <a:off x="4495800" y="3094687"/>
+            <a:off x="4495800" y="3247087"/>
             <a:ext cx="1905000" cy="0"/>
           </a:xfrm>
           <a:prstGeom prst="line">
@@ -4244,7 +4384,7 @@
         </p:nvSpPr>
         <p:spPr>
           <a:xfrm>
-            <a:off x="1981200" y="4146681"/>
+            <a:off x="4007471" y="5753126"/>
             <a:ext cx="457200" cy="307777"/>
           </a:xfrm>
           <a:prstGeom prst="rect">
@@ -4329,6 +4469,36 @@
               <a:t>Блок схема</a:t>
             </a:r>
             <a:endParaRPr lang="en-US" dirty="0"/>
+          </a:p>
+        </p:txBody>
+      </p:sp>
+      <p:sp>
+        <p:nvSpPr>
+          <p:cNvPr id="28" name="TextBox 27"/>
+          <p:cNvSpPr txBox="1"/>
+          <p:nvPr/>
+        </p:nvSpPr>
+        <p:spPr>
+          <a:xfrm>
+            <a:off x="1981200" y="4217139"/>
+            <a:ext cx="457200" cy="307777"/>
+          </a:xfrm>
+          <a:prstGeom prst="rect">
+            <a:avLst/>
+          </a:prstGeom>
+          <a:noFill/>
+        </p:spPr>
+        <p:txBody>
+          <a:bodyPr wrap="square" rtlCol="0">
+            <a:spAutoFit/>
+          </a:bodyPr>
+          <a:lstStyle/>
+          <a:p>
+            <a:r>
+              <a:rPr lang="ru-RU" sz="1400" dirty="0" smtClean="0"/>
+              <a:t>Нет</a:t>
+            </a:r>
+            <a:endParaRPr lang="en-US" sz="1400" dirty="0"/>
           </a:p>
         </p:txBody>
       </p:sp>

</xml_diff>